<commit_message>
Unit 1 Review Sep 30
</commit_message>
<xml_diff>
--- a/1400_03_Expressions and Interactivity.pptx
+++ b/1400_03_Expressions and Interactivity.pptx
@@ -2529,7 +2529,7 @@
               <a:pPr>
                 <a:defRPr/>
               </a:pPr>
-              <a:t>9/28/2022</a:t>
+              <a:t>9/30/2022</a:t>
             </a:fld>
             <a:endParaRPr lang="en-US"/>
           </a:p>
@@ -2823,7 +2823,7 @@
           <a:p>
             <a:fld id="{96DFF08F-DC6B-4601-B491-B0F83F6DD2DA}" type="datetimeFigureOut">
               <a:rPr lang="en-US" smtClean="0"/>
-              <a:t>9/28/2022</a:t>
+              <a:t>9/30/2022</a:t>
             </a:fld>
             <a:endParaRPr lang="en-US"/>
           </a:p>
@@ -3073,7 +3073,7 @@
           <a:p>
             <a:fld id="{96DFF08F-DC6B-4601-B491-B0F83F6DD2DA}" type="datetimeFigureOut">
               <a:rPr lang="en-US" smtClean="0"/>
-              <a:t>9/28/2022</a:t>
+              <a:t>9/30/2022</a:t>
             </a:fld>
             <a:endParaRPr lang="en-US"/>
           </a:p>
@@ -3335,7 +3335,7 @@
           <a:p>
             <a:fld id="{96DFF08F-DC6B-4601-B491-B0F83F6DD2DA}" type="datetimeFigureOut">
               <a:rPr lang="en-US" smtClean="0"/>
-              <a:t>9/28/2022</a:t>
+              <a:t>9/30/2022</a:t>
             </a:fld>
             <a:endParaRPr lang="en-US"/>
           </a:p>
@@ -3509,7 +3509,7 @@
           <a:p>
             <a:fld id="{A3E28D29-1ECB-41DF-951B-2A23F95AD026}" type="datetimeFigureOut">
               <a:rPr lang="en-US" smtClean="0"/>
-              <a:t>9/28/2022</a:t>
+              <a:t>9/30/2022</a:t>
             </a:fld>
             <a:endParaRPr lang="en-US"/>
           </a:p>
@@ -3813,7 +3813,7 @@
           <a:p>
             <a:fld id="{96DFF08F-DC6B-4601-B491-B0F83F6DD2DA}" type="datetimeFigureOut">
               <a:rPr lang="en-US" smtClean="0"/>
-              <a:t>9/28/2022</a:t>
+              <a:t>9/30/2022</a:t>
             </a:fld>
             <a:endParaRPr lang="en-US"/>
           </a:p>
@@ -4129,7 +4129,7 @@
           <a:p>
             <a:fld id="{96DFF08F-DC6B-4601-B491-B0F83F6DD2DA}" type="datetimeFigureOut">
               <a:rPr lang="en-US" smtClean="0"/>
-              <a:t>9/28/2022</a:t>
+              <a:t>9/30/2022</a:t>
             </a:fld>
             <a:endParaRPr lang="en-US"/>
           </a:p>
@@ -4511,7 +4511,7 @@
           <a:p>
             <a:fld id="{96DFF08F-DC6B-4601-B491-B0F83F6DD2DA}" type="datetimeFigureOut">
               <a:rPr lang="en-US" smtClean="0"/>
-              <a:t>9/28/2022</a:t>
+              <a:t>9/30/2022</a:t>
             </a:fld>
             <a:endParaRPr lang="en-US"/>
           </a:p>
@@ -4634,7 +4634,7 @@
           <a:p>
             <a:fld id="{96DFF08F-DC6B-4601-B491-B0F83F6DD2DA}" type="datetimeFigureOut">
               <a:rPr lang="en-US" smtClean="0"/>
-              <a:t>9/28/2022</a:t>
+              <a:t>9/30/2022</a:t>
             </a:fld>
             <a:endParaRPr lang="en-US"/>
           </a:p>
@@ -4814,7 +4814,7 @@
             <a:fld id="{96DFF08F-DC6B-4601-B491-B0F83F6DD2DA}" type="datetimeFigureOut">
               <a:rPr lang="en-US" smtClean="0"/>
               <a:pPr/>
-              <a:t>9/28/2022</a:t>
+              <a:t>9/30/2022</a:t>
             </a:fld>
             <a:endParaRPr lang="en-US"/>
           </a:p>
@@ -5175,7 +5175,7 @@
             <a:fld id="{96DFF08F-DC6B-4601-B491-B0F83F6DD2DA}" type="datetimeFigureOut">
               <a:rPr lang="en-US" smtClean="0"/>
               <a:pPr/>
-              <a:t>9/28/2022</a:t>
+              <a:t>9/30/2022</a:t>
             </a:fld>
             <a:endParaRPr lang="en-US"/>
           </a:p>
@@ -5558,7 +5558,7 @@
           <a:p>
             <a:fld id="{96DFF08F-DC6B-4601-B491-B0F83F6DD2DA}" type="datetimeFigureOut">
               <a:rPr lang="en-US" smtClean="0"/>
-              <a:t>9/28/2022</a:t>
+              <a:t>9/30/2022</a:t>
             </a:fld>
             <a:endParaRPr lang="en-US"/>
           </a:p>
@@ -5852,7 +5852,7 @@
             <a:fld id="{96DFF08F-DC6B-4601-B491-B0F83F6DD2DA}" type="datetimeFigureOut">
               <a:rPr lang="en-US" smtClean="0"/>
               <a:pPr/>
-              <a:t>9/28/2022</a:t>
+              <a:t>9/30/2022</a:t>
             </a:fld>
             <a:endParaRPr lang="en-US"/>
           </a:p>

</xml_diff>